<commit_message>
Added readings for foundational models
</commit_message>
<xml_diff>
--- a/modules/FoundationalModels/PPT_Models.pptx
+++ b/modules/FoundationalModels/PPT_Models.pptx
@@ -764,6 +764,104 @@
           <a:p>
             <a:r>
               <a:rPr lang="en-US" dirty="0" smtClean="0"/>
+              <a:t>What do you think happens to births</a:t>
+            </a:r>
+            <a:r>
+              <a:rPr lang="en-US" baseline="0" dirty="0" smtClean="0"/>
+              <a:t> as N increases? Deaths?</a:t>
+            </a:r>
+            <a:endParaRPr lang="en-US" dirty="0"/>
+          </a:p>
+        </p:txBody>
+      </p:sp>
+      <p:sp>
+        <p:nvSpPr>
+          <p:cNvPr id="4" name="Slide Number Placeholder 3"/>
+          <p:cNvSpPr>
+            <a:spLocks noGrp="1"/>
+          </p:cNvSpPr>
+          <p:nvPr>
+            <p:ph type="sldNum" sz="quarter" idx="10"/>
+          </p:nvPr>
+        </p:nvSpPr>
+        <p:spPr/>
+        <p:txBody>
+          <a:bodyPr/>
+          <a:lstStyle/>
+          <a:p>
+            <a:pPr>
+              <a:defRPr/>
+            </a:pPr>
+            <a:fld id="{A2E2256A-A507-439D-B2F3-19A96F092749}" type="slidenum">
+              <a:rPr lang="en-US" smtClean="0"/>
+              <a:pPr>
+                <a:defRPr/>
+              </a:pPr>
+              <a:t>7</a:t>
+            </a:fld>
+            <a:endParaRPr lang="en-US"/>
+          </a:p>
+        </p:txBody>
+      </p:sp>
+    </p:spTree>
+    <p:extLst>
+      <p:ext uri="{BB962C8B-B14F-4D97-AF65-F5344CB8AC3E}">
+        <p14:creationId xmlns:p14="http://schemas.microsoft.com/office/powerpoint/2010/main" val="2325879409"/>
+      </p:ext>
+    </p:extLst>
+  </p:cSld>
+  <p:clrMapOvr>
+    <a:masterClrMapping/>
+  </p:clrMapOvr>
+</p:notes>
+</file>
+
+<file path=ppt/notesSlides/notesSlide3.xml><?xml version="1.0" encoding="utf-8"?>
+<p:notes xmlns:a="http://schemas.openxmlformats.org/drawingml/2006/main" xmlns:r="http://schemas.openxmlformats.org/officeDocument/2006/relationships" xmlns:p="http://schemas.openxmlformats.org/presentationml/2006/main">
+  <p:cSld>
+    <p:spTree>
+      <p:nvGrpSpPr>
+        <p:cNvPr id="1" name=""/>
+        <p:cNvGrpSpPr/>
+        <p:nvPr/>
+      </p:nvGrpSpPr>
+      <p:grpSpPr>
+        <a:xfrm>
+          <a:off x="0" y="0"/>
+          <a:ext cx="0" cy="0"/>
+          <a:chOff x="0" y="0"/>
+          <a:chExt cx="0" cy="0"/>
+        </a:xfrm>
+      </p:grpSpPr>
+      <p:sp>
+        <p:nvSpPr>
+          <p:cNvPr id="2" name="Slide Image Placeholder 1"/>
+          <p:cNvSpPr>
+            <a:spLocks noGrp="1" noRot="1" noChangeAspect="1"/>
+          </p:cNvSpPr>
+          <p:nvPr>
+            <p:ph type="sldImg"/>
+          </p:nvPr>
+        </p:nvSpPr>
+        <p:spPr/>
+      </p:sp>
+      <p:sp>
+        <p:nvSpPr>
+          <p:cNvPr id="3" name="Notes Placeholder 2"/>
+          <p:cNvSpPr>
+            <a:spLocks noGrp="1"/>
+          </p:cNvSpPr>
+          <p:nvPr>
+            <p:ph type="body" idx="1"/>
+          </p:nvPr>
+        </p:nvSpPr>
+        <p:spPr/>
+        <p:txBody>
+          <a:bodyPr/>
+          <a:lstStyle/>
+          <a:p>
+            <a:r>
+              <a:rPr lang="en-US" dirty="0" smtClean="0"/>
               <a:t>r=</a:t>
             </a:r>
             <a:r>
@@ -851,7 +949,7 @@
 </p:notes>
 </file>
 
-<file path=ppt/notesSlides/notesSlide3.xml><?xml version="1.0" encoding="utf-8"?>
+<file path=ppt/notesSlides/notesSlide4.xml><?xml version="1.0" encoding="utf-8"?>
 <p:notes xmlns:a="http://schemas.openxmlformats.org/drawingml/2006/main" xmlns:r="http://schemas.openxmlformats.org/officeDocument/2006/relationships" xmlns:p="http://schemas.openxmlformats.org/presentationml/2006/main">
   <p:cSld>
     <p:spTree>
@@ -11583,7 +11681,7 @@
           <p:nvPr/>
         </p:nvPicPr>
         <p:blipFill>
-          <a:blip r:embed="rId2">
+          <a:blip r:embed="rId3">
             <a:extLst>
               <a:ext uri="{28A0092B-C50C-407E-A947-70E740481C1C}">
                 <a14:useLocalDpi xmlns:a14="http://schemas.microsoft.com/office/drawing/2010/main" val="0"/>
@@ -11647,7 +11745,7 @@
           <p:nvPr/>
         </p:nvPicPr>
         <p:blipFill>
-          <a:blip r:embed="rId3">
+          <a:blip r:embed="rId4">
             <a:extLst>
               <a:ext uri="{28A0092B-C50C-407E-A947-70E740481C1C}">
                 <a14:useLocalDpi xmlns:a14="http://schemas.microsoft.com/office/drawing/2010/main" val="0"/>

</xml_diff>

<commit_message>
Updated Foundational Models module
</commit_message>
<xml_diff>
--- a/modules/FoundationalModels/PPT_Models.pptx
+++ b/modules/FoundationalModels/PPT_Models.pptx
@@ -7050,8 +7050,12 @@
           <a:lstStyle/>
           <a:p>
             <a:r>
+              <a:rPr lang="en-US" u="sng" dirty="0" smtClean="0"/>
+              <a:t>Rate of change</a:t>
+            </a:r>
+            <a:r>
               <a:rPr lang="en-US" dirty="0" smtClean="0"/>
-              <a:t>Rate of change </a:t>
+              <a:t> </a:t>
             </a:r>
             <a:r>
               <a:rPr lang="en-US" b="1" dirty="0" smtClean="0">
@@ -7396,8 +7400,12 @@
           <a:lstStyle/>
           <a:p>
             <a:r>
+              <a:rPr lang="en-US" u="sng" dirty="0" smtClean="0"/>
+              <a:t>Rate of change</a:t>
+            </a:r>
+            <a:r>
               <a:rPr lang="en-US" dirty="0" smtClean="0"/>
-              <a:t>Rate of change </a:t>
+              <a:t> </a:t>
             </a:r>
             <a:r>
               <a:rPr lang="en-US" b="1" dirty="0" smtClean="0">
@@ -7627,8 +7635,12 @@
           <a:lstStyle/>
           <a:p>
             <a:r>
+              <a:rPr lang="en-US" u="sng" dirty="0" smtClean="0"/>
+              <a:t>Rate of change</a:t>
+            </a:r>
+            <a:r>
               <a:rPr lang="en-US" dirty="0" smtClean="0"/>
-              <a:t>Rate of change </a:t>
+              <a:t> </a:t>
             </a:r>
             <a:r>
               <a:rPr lang="en-US" b="1" dirty="0" smtClean="0">

</xml_diff>